<commit_message>
added error handling for wrong input and also added price with recommendations!
</commit_message>
<xml_diff>
--- a/Phone recommendation system.pptx
+++ b/Phone recommendation system.pptx
@@ -15,17 +15,20 @@
     <p:sldId id="263" r:id="rId9"/>
     <p:sldId id="264" r:id="rId10"/>
     <p:sldId id="265" r:id="rId11"/>
-    <p:sldId id="266" r:id="rId12"/>
-    <p:sldId id="267" r:id="rId13"/>
-    <p:sldId id="268" r:id="rId14"/>
-    <p:sldId id="269" r:id="rId15"/>
-    <p:sldId id="271" r:id="rId16"/>
-    <p:sldId id="270" r:id="rId17"/>
-    <p:sldId id="272" r:id="rId18"/>
-    <p:sldId id="273" r:id="rId19"/>
-    <p:sldId id="274" r:id="rId20"/>
-    <p:sldId id="275" r:id="rId21"/>
-    <p:sldId id="283" r:id="rId22"/>
+    <p:sldId id="287" r:id="rId12"/>
+    <p:sldId id="288" r:id="rId13"/>
+    <p:sldId id="286" r:id="rId14"/>
+    <p:sldId id="266" r:id="rId15"/>
+    <p:sldId id="272" r:id="rId16"/>
+    <p:sldId id="267" r:id="rId17"/>
+    <p:sldId id="284" r:id="rId18"/>
+    <p:sldId id="268" r:id="rId19"/>
+    <p:sldId id="269" r:id="rId20"/>
+    <p:sldId id="271" r:id="rId21"/>
+    <p:sldId id="273" r:id="rId22"/>
+    <p:sldId id="274" r:id="rId23"/>
+    <p:sldId id="285" r:id="rId24"/>
+    <p:sldId id="283" r:id="rId25"/>
   </p:sldIdLst>
   <p:sldSz cx="9144000" cy="6858000" type="screen4x3"/>
   <p:notesSz cx="6858000" cy="9144000"/>
@@ -5044,8 +5047,8 @@
         </p:nvSpPr>
         <p:spPr>
           <a:xfrm>
-            <a:off x="2123728" y="3429000"/>
-            <a:ext cx="3867944" cy="2592288"/>
+            <a:off x="2195736" y="3877216"/>
+            <a:ext cx="3867944" cy="1634724"/>
           </a:xfrm>
         </p:spPr>
         <p:txBody>
@@ -5085,11 +5088,13 @@
         <p:spPr>
           <a:xfrm>
             <a:off x="5652120" y="5511940"/>
-            <a:ext cx="3310136" cy="1371600"/>
-          </a:xfrm>
-        </p:spPr>
-        <p:txBody>
-          <a:bodyPr/>
+            <a:ext cx="3491880" cy="1346060"/>
+          </a:xfrm>
+        </p:spPr>
+        <p:txBody>
+          <a:bodyPr>
+            <a:normAutofit/>
+          </a:bodyPr>
           <a:lstStyle/>
           <a:p>
             <a:r>
@@ -5110,41 +5115,8 @@
                 </a:solidFill>
                 <a:latin typeface="Algerian" pitchFamily="82" charset="0"/>
               </a:rPr>
-              <a:t>       </a:t>
-            </a:r>
-            <a:r>
-              <a:rPr lang="en-US" sz="2000" b="0" dirty="0" err="1">
-                <a:solidFill>
-                  <a:schemeClr val="tx1"/>
-                </a:solidFill>
-                <a:latin typeface="Algerian" pitchFamily="82" charset="0"/>
-              </a:rPr>
-              <a:t>Rushikesh</a:t>
-            </a:r>
-            <a:r>
-              <a:rPr lang="en-US" sz="2000" b="0" dirty="0">
-                <a:solidFill>
-                  <a:schemeClr val="tx1"/>
-                </a:solidFill>
-                <a:latin typeface="Algerian" pitchFamily="82" charset="0"/>
-              </a:rPr>
-              <a:t>  </a:t>
-            </a:r>
-            <a:r>
-              <a:rPr lang="en-US" sz="2000" b="0" dirty="0" err="1">
-                <a:solidFill>
-                  <a:schemeClr val="tx1"/>
-                </a:solidFill>
-                <a:latin typeface="Algerian" pitchFamily="82" charset="0"/>
-              </a:rPr>
-              <a:t>shinde</a:t>
-            </a:r>
-            <a:endParaRPr lang="en-US" sz="2000" b="0" dirty="0">
-              <a:solidFill>
-                <a:schemeClr val="tx1"/>
-              </a:solidFill>
-              <a:latin typeface="Algerian" pitchFamily="82" charset="0"/>
-            </a:endParaRPr>
+              <a:t>       Rushikesh  shinde</a:t>
+            </a:r>
           </a:p>
           <a:p>
             <a:r>
@@ -5282,7 +5254,7 @@
             </a:pPr>
             <a:r>
               <a:rPr lang="en-US" dirty="0"/>
-              <a:t> Label encoder </a:t>
+              <a:t> Count Vectorizer</a:t>
             </a:r>
           </a:p>
           <a:p>
@@ -5302,7 +5274,7 @@
             </a:pPr>
             <a:r>
               <a:rPr lang="en-US" dirty="0"/>
-              <a:t> Data partition</a:t>
+              <a:t> Tokenization</a:t>
             </a:r>
           </a:p>
           <a:p>
@@ -5312,42 +5284,26 @@
             </a:pPr>
             <a:r>
               <a:rPr lang="en-US" dirty="0"/>
-              <a:t> model Building</a:t>
+              <a:t> Model Building:</a:t>
             </a:r>
           </a:p>
           <a:p>
             <a:r>
               <a:rPr lang="en-US" dirty="0"/>
-              <a:t>                a) Logistic Regression</a:t>
+              <a:t>                a) KMeans</a:t>
             </a:r>
           </a:p>
           <a:p>
             <a:r>
               <a:rPr lang="en-US" dirty="0"/>
-              <a:t>                b) Decision Tree</a:t>
+              <a:t>                b) LSTM</a:t>
             </a:r>
           </a:p>
           <a:p>
             <a:r>
               <a:rPr lang="en-US" dirty="0"/>
-              <a:t>                c)  Random forest</a:t>
-            </a:r>
-          </a:p>
-          <a:p>
-            <a:r>
-              <a:rPr lang="en-US" dirty="0"/>
-              <a:t>                d) Gradient Boosting</a:t>
-            </a:r>
-          </a:p>
-          <a:p>
-            <a:r>
-              <a:rPr lang="en-US" dirty="0"/>
-              <a:t>                e) Naïve Bayes                  </a:t>
-            </a:r>
-            <a:endParaRPr lang="en-IN" dirty="0"/>
-          </a:p>
-          <a:p>
-            <a:endParaRPr lang="en-IN" dirty="0"/>
+              <a:t>                c) Cosine Similarity </a:t>
+            </a:r>
           </a:p>
         </p:txBody>
       </p:sp>
@@ -5383,40 +5339,84 @@
       </p:grpSpPr>
       <p:sp>
         <p:nvSpPr>
-          <p:cNvPr id="2" name="Rectangle 1"/>
-          <p:cNvSpPr/>
-          <p:nvPr/>
+          <p:cNvPr id="2" name="Title 1">
+            <a:extLst>
+              <a:ext uri="{FF2B5EF4-FFF2-40B4-BE49-F238E27FC236}">
+                <a16:creationId xmlns:a16="http://schemas.microsoft.com/office/drawing/2014/main" id="{A3C5C149-1204-C705-D9E5-0DB5DAB7833D}"/>
+              </a:ext>
+            </a:extLst>
+          </p:cNvPr>
+          <p:cNvSpPr>
+            <a:spLocks noGrp="1"/>
+          </p:cNvSpPr>
+          <p:nvPr>
+            <p:ph type="title"/>
+          </p:nvPr>
         </p:nvSpPr>
         <p:spPr>
           <a:xfrm>
-            <a:off x="323528" y="2828835"/>
-            <a:ext cx="8532440" cy="830997"/>
-          </a:xfrm>
-          <a:prstGeom prst="rect">
-            <a:avLst/>
-          </a:prstGeom>
-        </p:spPr>
-        <p:txBody>
-          <a:bodyPr wrap="square">
-            <a:spAutoFit/>
+            <a:off x="683568" y="116632"/>
+            <a:ext cx="7467600" cy="508918"/>
+          </a:xfrm>
+        </p:spPr>
+        <p:txBody>
+          <a:bodyPr>
+            <a:normAutofit fontScale="90000"/>
           </a:bodyPr>
           <a:lstStyle/>
           <a:p>
             <a:pPr algn="ctr"/>
             <a:r>
-              <a:rPr lang="en-US" sz="4800" dirty="0">
-                <a:cs typeface="Arial" pitchFamily="34" charset="0"/>
-              </a:rPr>
-              <a:t>Data Visualization</a:t>
-            </a:r>
-            <a:endParaRPr lang="en-IN" sz="4800" dirty="0"/>
-          </a:p>
-        </p:txBody>
-      </p:sp>
+              <a:rPr lang="en-US" dirty="0" err="1"/>
+              <a:t>Kmeans</a:t>
+            </a:r>
+            <a:r>
+              <a:rPr lang="en-US" dirty="0"/>
+              <a:t> Elbow Plot</a:t>
+            </a:r>
+            <a:endParaRPr lang="en-IN" dirty="0"/>
+          </a:p>
+        </p:txBody>
+      </p:sp>
+      <p:pic>
+        <p:nvPicPr>
+          <p:cNvPr id="5" name="Content Placeholder 4" descr="A graph of a person with a blue line&#10;&#10;Description automatically generated">
+            <a:extLst>
+              <a:ext uri="{FF2B5EF4-FFF2-40B4-BE49-F238E27FC236}">
+                <a16:creationId xmlns:a16="http://schemas.microsoft.com/office/drawing/2014/main" id="{01A964C4-52D6-990C-EEA4-07B78712FFC7}"/>
+              </a:ext>
+            </a:extLst>
+          </p:cNvPr>
+          <p:cNvPicPr>
+            <a:picLocks noGrp="1" noChangeAspect="1"/>
+          </p:cNvPicPr>
+          <p:nvPr>
+            <p:ph sz="quarter" idx="1"/>
+          </p:nvPr>
+        </p:nvPicPr>
+        <p:blipFill>
+          <a:blip r:embed="rId2">
+            <a:extLst>
+              <a:ext uri="{28A0092B-C50C-407E-A947-70E740481C1C}">
+                <a14:useLocalDpi xmlns:a14="http://schemas.microsoft.com/office/drawing/2010/main" val="0"/>
+              </a:ext>
+            </a:extLst>
+          </a:blip>
+          <a:stretch>
+            <a:fillRect/>
+          </a:stretch>
+        </p:blipFill>
+        <p:spPr>
+          <a:xfrm>
+            <a:off x="0" y="625550"/>
+            <a:ext cx="9144000" cy="6232449"/>
+          </a:xfrm>
+        </p:spPr>
+      </p:pic>
     </p:spTree>
     <p:extLst>
       <p:ext uri="{BB962C8B-B14F-4D97-AF65-F5344CB8AC3E}">
-        <p14:creationId xmlns:p14="http://schemas.microsoft.com/office/powerpoint/2010/main" val="1770785593"/>
+        <p14:creationId xmlns:p14="http://schemas.microsoft.com/office/powerpoint/2010/main" val="2260340303"/>
       </p:ext>
     </p:extLst>
   </p:cSld>
@@ -5443,40 +5443,785 @@
           <a:chExt cx="0" cy="0"/>
         </a:xfrm>
       </p:grpSpPr>
-      <p:pic>
-        <p:nvPicPr>
-          <p:cNvPr id="2" name="Picture 1"/>
-          <p:cNvPicPr>
-            <a:picLocks noChangeAspect="1"/>
-          </p:cNvPicPr>
-          <p:nvPr/>
-        </p:nvPicPr>
-        <p:blipFill>
-          <a:blip r:embed="rId2">
+      <p:sp>
+        <p:nvSpPr>
+          <p:cNvPr id="4" name="Title 1">
             <a:extLst>
-              <a:ext uri="{28A0092B-C50C-407E-A947-70E740481C1C}">
-                <a14:useLocalDpi xmlns:a14="http://schemas.microsoft.com/office/drawing/2010/main" val="0"/>
+              <a:ext uri="{FF2B5EF4-FFF2-40B4-BE49-F238E27FC236}">
+                <a16:creationId xmlns:a16="http://schemas.microsoft.com/office/drawing/2014/main" id="{70A2ED4C-BC77-7AA1-387C-3DE9A8BF4DD6}"/>
               </a:ext>
             </a:extLst>
-          </a:blip>
-          <a:stretch>
-            <a:fillRect/>
-          </a:stretch>
-        </p:blipFill>
+          </p:cNvPr>
+          <p:cNvSpPr>
+            <a:spLocks noGrp="1"/>
+          </p:cNvSpPr>
+          <p:nvPr/>
+        </p:nvSpPr>
         <p:spPr>
           <a:xfrm>
-            <a:off x="323528" y="908720"/>
-            <a:ext cx="8424936" cy="5279226"/>
+            <a:off x="683568" y="433599"/>
+            <a:ext cx="7467600" cy="562074"/>
           </a:xfrm>
           <a:prstGeom prst="rect">
             <a:avLst/>
           </a:prstGeom>
         </p:spPr>
-      </p:pic>
+        <p:txBody>
+          <a:bodyPr vert="horz" anchor="b">
+            <a:normAutofit/>
+          </a:bodyPr>
+          <a:lstStyle>
+            <a:lvl1pPr algn="l" rtl="0" eaLnBrk="1" latinLnBrk="0" hangingPunct="1">
+              <a:spcBef>
+                <a:spcPct val="0"/>
+              </a:spcBef>
+              <a:buNone/>
+              <a:defRPr kumimoji="0" sz="3000" b="0" kern="1200" cap="small" baseline="0">
+                <a:solidFill>
+                  <a:schemeClr val="tx2"/>
+                </a:solidFill>
+                <a:latin typeface="+mj-lt"/>
+                <a:ea typeface="+mj-ea"/>
+                <a:cs typeface="+mj-cs"/>
+              </a:defRPr>
+            </a:lvl1pPr>
+          </a:lstStyle>
+          <a:p>
+            <a:pPr algn="ctr"/>
+            <a:r>
+              <a:rPr lang="en-US" b="1" dirty="0">
+                <a:solidFill>
+                  <a:schemeClr val="tx1"/>
+                </a:solidFill>
+              </a:rPr>
+              <a:t>DATA PARTITION</a:t>
+            </a:r>
+            <a:endParaRPr lang="en-IN" b="1" dirty="0">
+              <a:solidFill>
+                <a:schemeClr val="tx1"/>
+              </a:solidFill>
+            </a:endParaRPr>
+          </a:p>
+        </p:txBody>
+      </p:sp>
+      <p:sp>
+        <p:nvSpPr>
+          <p:cNvPr id="5" name="Rectangle 4">
+            <a:extLst>
+              <a:ext uri="{FF2B5EF4-FFF2-40B4-BE49-F238E27FC236}">
+                <a16:creationId xmlns:a16="http://schemas.microsoft.com/office/drawing/2014/main" id="{599D1558-C155-DD06-721E-7183C79419B0}"/>
+              </a:ext>
+            </a:extLst>
+          </p:cNvPr>
+          <p:cNvSpPr/>
+          <p:nvPr/>
+        </p:nvSpPr>
+        <p:spPr>
+          <a:xfrm>
+            <a:off x="1475656" y="2305807"/>
+            <a:ext cx="4104456" cy="864096"/>
+          </a:xfrm>
+          <a:prstGeom prst="rect">
+            <a:avLst/>
+          </a:prstGeom>
+          <a:solidFill>
+            <a:schemeClr val="accent2">
+              <a:lumMod val="75000"/>
+            </a:schemeClr>
+          </a:solidFill>
+        </p:spPr>
+        <p:style>
+          <a:lnRef idx="2">
+            <a:schemeClr val="accent1">
+              <a:shade val="50000"/>
+            </a:schemeClr>
+          </a:lnRef>
+          <a:fillRef idx="1">
+            <a:schemeClr val="accent1"/>
+          </a:fillRef>
+          <a:effectRef idx="0">
+            <a:schemeClr val="accent1"/>
+          </a:effectRef>
+          <a:fontRef idx="minor">
+            <a:schemeClr val="lt1"/>
+          </a:fontRef>
+        </p:style>
+        <p:txBody>
+          <a:bodyPr rtlCol="0" anchor="ctr"/>
+          <a:lstStyle>
+            <a:defPPr>
+              <a:defRPr lang="en-US"/>
+            </a:defPPr>
+            <a:lvl1pPr marL="0" algn="l" defTabSz="914400" rtl="0" eaLnBrk="1" latinLnBrk="0" hangingPunct="1">
+              <a:defRPr sz="1800" kern="1200">
+                <a:solidFill>
+                  <a:schemeClr val="lt1"/>
+                </a:solidFill>
+                <a:latin typeface="+mn-lt"/>
+                <a:ea typeface="+mn-ea"/>
+                <a:cs typeface="+mn-cs"/>
+              </a:defRPr>
+            </a:lvl1pPr>
+            <a:lvl2pPr marL="457200" algn="l" defTabSz="914400" rtl="0" eaLnBrk="1" latinLnBrk="0" hangingPunct="1">
+              <a:defRPr sz="1800" kern="1200">
+                <a:solidFill>
+                  <a:schemeClr val="lt1"/>
+                </a:solidFill>
+                <a:latin typeface="+mn-lt"/>
+                <a:ea typeface="+mn-ea"/>
+                <a:cs typeface="+mn-cs"/>
+              </a:defRPr>
+            </a:lvl2pPr>
+            <a:lvl3pPr marL="914400" algn="l" defTabSz="914400" rtl="0" eaLnBrk="1" latinLnBrk="0" hangingPunct="1">
+              <a:defRPr sz="1800" kern="1200">
+                <a:solidFill>
+                  <a:schemeClr val="lt1"/>
+                </a:solidFill>
+                <a:latin typeface="+mn-lt"/>
+                <a:ea typeface="+mn-ea"/>
+                <a:cs typeface="+mn-cs"/>
+              </a:defRPr>
+            </a:lvl3pPr>
+            <a:lvl4pPr marL="1371600" algn="l" defTabSz="914400" rtl="0" eaLnBrk="1" latinLnBrk="0" hangingPunct="1">
+              <a:defRPr sz="1800" kern="1200">
+                <a:solidFill>
+                  <a:schemeClr val="lt1"/>
+                </a:solidFill>
+                <a:latin typeface="+mn-lt"/>
+                <a:ea typeface="+mn-ea"/>
+                <a:cs typeface="+mn-cs"/>
+              </a:defRPr>
+            </a:lvl4pPr>
+            <a:lvl5pPr marL="1828800" algn="l" defTabSz="914400" rtl="0" eaLnBrk="1" latinLnBrk="0" hangingPunct="1">
+              <a:defRPr sz="1800" kern="1200">
+                <a:solidFill>
+                  <a:schemeClr val="lt1"/>
+                </a:solidFill>
+                <a:latin typeface="+mn-lt"/>
+                <a:ea typeface="+mn-ea"/>
+                <a:cs typeface="+mn-cs"/>
+              </a:defRPr>
+            </a:lvl5pPr>
+            <a:lvl6pPr marL="2286000" algn="l" defTabSz="914400" rtl="0" eaLnBrk="1" latinLnBrk="0" hangingPunct="1">
+              <a:defRPr sz="1800" kern="1200">
+                <a:solidFill>
+                  <a:schemeClr val="lt1"/>
+                </a:solidFill>
+                <a:latin typeface="+mn-lt"/>
+                <a:ea typeface="+mn-ea"/>
+                <a:cs typeface="+mn-cs"/>
+              </a:defRPr>
+            </a:lvl6pPr>
+            <a:lvl7pPr marL="2743200" algn="l" defTabSz="914400" rtl="0" eaLnBrk="1" latinLnBrk="0" hangingPunct="1">
+              <a:defRPr sz="1800" kern="1200">
+                <a:solidFill>
+                  <a:schemeClr val="lt1"/>
+                </a:solidFill>
+                <a:latin typeface="+mn-lt"/>
+                <a:ea typeface="+mn-ea"/>
+                <a:cs typeface="+mn-cs"/>
+              </a:defRPr>
+            </a:lvl7pPr>
+            <a:lvl8pPr marL="3200400" algn="l" defTabSz="914400" rtl="0" eaLnBrk="1" latinLnBrk="0" hangingPunct="1">
+              <a:defRPr sz="1800" kern="1200">
+                <a:solidFill>
+                  <a:schemeClr val="lt1"/>
+                </a:solidFill>
+                <a:latin typeface="+mn-lt"/>
+                <a:ea typeface="+mn-ea"/>
+                <a:cs typeface="+mn-cs"/>
+              </a:defRPr>
+            </a:lvl8pPr>
+            <a:lvl9pPr marL="3657600" algn="l" defTabSz="914400" rtl="0" eaLnBrk="1" latinLnBrk="0" hangingPunct="1">
+              <a:defRPr sz="1800" kern="1200">
+                <a:solidFill>
+                  <a:schemeClr val="lt1"/>
+                </a:solidFill>
+                <a:latin typeface="+mn-lt"/>
+                <a:ea typeface="+mn-ea"/>
+                <a:cs typeface="+mn-cs"/>
+              </a:defRPr>
+            </a:lvl9pPr>
+          </a:lstStyle>
+          <a:p>
+            <a:pPr algn="ctr"/>
+            <a:endParaRPr lang="en-IN"/>
+          </a:p>
+        </p:txBody>
+      </p:sp>
+      <p:sp>
+        <p:nvSpPr>
+          <p:cNvPr id="6" name="Rectangle 5">
+            <a:extLst>
+              <a:ext uri="{FF2B5EF4-FFF2-40B4-BE49-F238E27FC236}">
+                <a16:creationId xmlns:a16="http://schemas.microsoft.com/office/drawing/2014/main" id="{14A3DC49-D7FB-2A7B-DE60-4F6EC738BEBF}"/>
+              </a:ext>
+            </a:extLst>
+          </p:cNvPr>
+          <p:cNvSpPr/>
+          <p:nvPr/>
+        </p:nvSpPr>
+        <p:spPr>
+          <a:xfrm>
+            <a:off x="5580112" y="2305807"/>
+            <a:ext cx="1872208" cy="864096"/>
+          </a:xfrm>
+          <a:prstGeom prst="rect">
+            <a:avLst/>
+          </a:prstGeom>
+        </p:spPr>
+        <p:style>
+          <a:lnRef idx="2">
+            <a:schemeClr val="accent1">
+              <a:shade val="50000"/>
+            </a:schemeClr>
+          </a:lnRef>
+          <a:fillRef idx="1">
+            <a:schemeClr val="accent1"/>
+          </a:fillRef>
+          <a:effectRef idx="0">
+            <a:schemeClr val="accent1"/>
+          </a:effectRef>
+          <a:fontRef idx="minor">
+            <a:schemeClr val="lt1"/>
+          </a:fontRef>
+        </p:style>
+        <p:txBody>
+          <a:bodyPr rtlCol="0" anchor="ctr"/>
+          <a:lstStyle>
+            <a:defPPr>
+              <a:defRPr lang="en-US"/>
+            </a:defPPr>
+            <a:lvl1pPr marL="0" algn="l" defTabSz="914400" rtl="0" eaLnBrk="1" latinLnBrk="0" hangingPunct="1">
+              <a:defRPr sz="1800" kern="1200">
+                <a:solidFill>
+                  <a:schemeClr val="lt1"/>
+                </a:solidFill>
+                <a:latin typeface="+mn-lt"/>
+                <a:ea typeface="+mn-ea"/>
+                <a:cs typeface="+mn-cs"/>
+              </a:defRPr>
+            </a:lvl1pPr>
+            <a:lvl2pPr marL="457200" algn="l" defTabSz="914400" rtl="0" eaLnBrk="1" latinLnBrk="0" hangingPunct="1">
+              <a:defRPr sz="1800" kern="1200">
+                <a:solidFill>
+                  <a:schemeClr val="lt1"/>
+                </a:solidFill>
+                <a:latin typeface="+mn-lt"/>
+                <a:ea typeface="+mn-ea"/>
+                <a:cs typeface="+mn-cs"/>
+              </a:defRPr>
+            </a:lvl2pPr>
+            <a:lvl3pPr marL="914400" algn="l" defTabSz="914400" rtl="0" eaLnBrk="1" latinLnBrk="0" hangingPunct="1">
+              <a:defRPr sz="1800" kern="1200">
+                <a:solidFill>
+                  <a:schemeClr val="lt1"/>
+                </a:solidFill>
+                <a:latin typeface="+mn-lt"/>
+                <a:ea typeface="+mn-ea"/>
+                <a:cs typeface="+mn-cs"/>
+              </a:defRPr>
+            </a:lvl3pPr>
+            <a:lvl4pPr marL="1371600" algn="l" defTabSz="914400" rtl="0" eaLnBrk="1" latinLnBrk="0" hangingPunct="1">
+              <a:defRPr sz="1800" kern="1200">
+                <a:solidFill>
+                  <a:schemeClr val="lt1"/>
+                </a:solidFill>
+                <a:latin typeface="+mn-lt"/>
+                <a:ea typeface="+mn-ea"/>
+                <a:cs typeface="+mn-cs"/>
+              </a:defRPr>
+            </a:lvl4pPr>
+            <a:lvl5pPr marL="1828800" algn="l" defTabSz="914400" rtl="0" eaLnBrk="1" latinLnBrk="0" hangingPunct="1">
+              <a:defRPr sz="1800" kern="1200">
+                <a:solidFill>
+                  <a:schemeClr val="lt1"/>
+                </a:solidFill>
+                <a:latin typeface="+mn-lt"/>
+                <a:ea typeface="+mn-ea"/>
+                <a:cs typeface="+mn-cs"/>
+              </a:defRPr>
+            </a:lvl5pPr>
+            <a:lvl6pPr marL="2286000" algn="l" defTabSz="914400" rtl="0" eaLnBrk="1" latinLnBrk="0" hangingPunct="1">
+              <a:defRPr sz="1800" kern="1200">
+                <a:solidFill>
+                  <a:schemeClr val="lt1"/>
+                </a:solidFill>
+                <a:latin typeface="+mn-lt"/>
+                <a:ea typeface="+mn-ea"/>
+                <a:cs typeface="+mn-cs"/>
+              </a:defRPr>
+            </a:lvl6pPr>
+            <a:lvl7pPr marL="2743200" algn="l" defTabSz="914400" rtl="0" eaLnBrk="1" latinLnBrk="0" hangingPunct="1">
+              <a:defRPr sz="1800" kern="1200">
+                <a:solidFill>
+                  <a:schemeClr val="lt1"/>
+                </a:solidFill>
+                <a:latin typeface="+mn-lt"/>
+                <a:ea typeface="+mn-ea"/>
+                <a:cs typeface="+mn-cs"/>
+              </a:defRPr>
+            </a:lvl7pPr>
+            <a:lvl8pPr marL="3200400" algn="l" defTabSz="914400" rtl="0" eaLnBrk="1" latinLnBrk="0" hangingPunct="1">
+              <a:defRPr sz="1800" kern="1200">
+                <a:solidFill>
+                  <a:schemeClr val="lt1"/>
+                </a:solidFill>
+                <a:latin typeface="+mn-lt"/>
+                <a:ea typeface="+mn-ea"/>
+                <a:cs typeface="+mn-cs"/>
+              </a:defRPr>
+            </a:lvl8pPr>
+            <a:lvl9pPr marL="3657600" algn="l" defTabSz="914400" rtl="0" eaLnBrk="1" latinLnBrk="0" hangingPunct="1">
+              <a:defRPr sz="1800" kern="1200">
+                <a:solidFill>
+                  <a:schemeClr val="lt1"/>
+                </a:solidFill>
+                <a:latin typeface="+mn-lt"/>
+                <a:ea typeface="+mn-ea"/>
+                <a:cs typeface="+mn-cs"/>
+              </a:defRPr>
+            </a:lvl9pPr>
+          </a:lstStyle>
+          <a:p>
+            <a:pPr algn="ctr"/>
+            <a:endParaRPr lang="en-IN"/>
+          </a:p>
+        </p:txBody>
+      </p:sp>
+      <p:sp>
+        <p:nvSpPr>
+          <p:cNvPr id="7" name="TextBox 6">
+            <a:extLst>
+              <a:ext uri="{FF2B5EF4-FFF2-40B4-BE49-F238E27FC236}">
+                <a16:creationId xmlns:a16="http://schemas.microsoft.com/office/drawing/2014/main" id="{ADC32AFE-EC9B-9778-E51F-69354E48EE5C}"/>
+              </a:ext>
+            </a:extLst>
+          </p:cNvPr>
+          <p:cNvSpPr txBox="1"/>
+          <p:nvPr/>
+        </p:nvSpPr>
+        <p:spPr>
+          <a:xfrm>
+            <a:off x="2051720" y="2593839"/>
+            <a:ext cx="3024336" cy="646331"/>
+          </a:xfrm>
+          <a:prstGeom prst="rect">
+            <a:avLst/>
+          </a:prstGeom>
+          <a:noFill/>
+        </p:spPr>
+        <p:txBody>
+          <a:bodyPr wrap="square" rtlCol="0">
+            <a:spAutoFit/>
+          </a:bodyPr>
+          <a:lstStyle>
+            <a:defPPr>
+              <a:defRPr lang="en-US"/>
+            </a:defPPr>
+            <a:lvl1pPr marL="0" algn="l" defTabSz="914400" rtl="0" eaLnBrk="1" latinLnBrk="0" hangingPunct="1">
+              <a:defRPr sz="1800" kern="1200">
+                <a:solidFill>
+                  <a:schemeClr val="tx1"/>
+                </a:solidFill>
+                <a:latin typeface="+mn-lt"/>
+                <a:ea typeface="+mn-ea"/>
+                <a:cs typeface="+mn-cs"/>
+              </a:defRPr>
+            </a:lvl1pPr>
+            <a:lvl2pPr marL="457200" algn="l" defTabSz="914400" rtl="0" eaLnBrk="1" latinLnBrk="0" hangingPunct="1">
+              <a:defRPr sz="1800" kern="1200">
+                <a:solidFill>
+                  <a:schemeClr val="tx1"/>
+                </a:solidFill>
+                <a:latin typeface="+mn-lt"/>
+                <a:ea typeface="+mn-ea"/>
+                <a:cs typeface="+mn-cs"/>
+              </a:defRPr>
+            </a:lvl2pPr>
+            <a:lvl3pPr marL="914400" algn="l" defTabSz="914400" rtl="0" eaLnBrk="1" latinLnBrk="0" hangingPunct="1">
+              <a:defRPr sz="1800" kern="1200">
+                <a:solidFill>
+                  <a:schemeClr val="tx1"/>
+                </a:solidFill>
+                <a:latin typeface="+mn-lt"/>
+                <a:ea typeface="+mn-ea"/>
+                <a:cs typeface="+mn-cs"/>
+              </a:defRPr>
+            </a:lvl3pPr>
+            <a:lvl4pPr marL="1371600" algn="l" defTabSz="914400" rtl="0" eaLnBrk="1" latinLnBrk="0" hangingPunct="1">
+              <a:defRPr sz="1800" kern="1200">
+                <a:solidFill>
+                  <a:schemeClr val="tx1"/>
+                </a:solidFill>
+                <a:latin typeface="+mn-lt"/>
+                <a:ea typeface="+mn-ea"/>
+                <a:cs typeface="+mn-cs"/>
+              </a:defRPr>
+            </a:lvl4pPr>
+            <a:lvl5pPr marL="1828800" algn="l" defTabSz="914400" rtl="0" eaLnBrk="1" latinLnBrk="0" hangingPunct="1">
+              <a:defRPr sz="1800" kern="1200">
+                <a:solidFill>
+                  <a:schemeClr val="tx1"/>
+                </a:solidFill>
+                <a:latin typeface="+mn-lt"/>
+                <a:ea typeface="+mn-ea"/>
+                <a:cs typeface="+mn-cs"/>
+              </a:defRPr>
+            </a:lvl5pPr>
+            <a:lvl6pPr marL="2286000" algn="l" defTabSz="914400" rtl="0" eaLnBrk="1" latinLnBrk="0" hangingPunct="1">
+              <a:defRPr sz="1800" kern="1200">
+                <a:solidFill>
+                  <a:schemeClr val="tx1"/>
+                </a:solidFill>
+                <a:latin typeface="+mn-lt"/>
+                <a:ea typeface="+mn-ea"/>
+                <a:cs typeface="+mn-cs"/>
+              </a:defRPr>
+            </a:lvl6pPr>
+            <a:lvl7pPr marL="2743200" algn="l" defTabSz="914400" rtl="0" eaLnBrk="1" latinLnBrk="0" hangingPunct="1">
+              <a:defRPr sz="1800" kern="1200">
+                <a:solidFill>
+                  <a:schemeClr val="tx1"/>
+                </a:solidFill>
+                <a:latin typeface="+mn-lt"/>
+                <a:ea typeface="+mn-ea"/>
+                <a:cs typeface="+mn-cs"/>
+              </a:defRPr>
+            </a:lvl7pPr>
+            <a:lvl8pPr marL="3200400" algn="l" defTabSz="914400" rtl="0" eaLnBrk="1" latinLnBrk="0" hangingPunct="1">
+              <a:defRPr sz="1800" kern="1200">
+                <a:solidFill>
+                  <a:schemeClr val="tx1"/>
+                </a:solidFill>
+                <a:latin typeface="+mn-lt"/>
+                <a:ea typeface="+mn-ea"/>
+                <a:cs typeface="+mn-cs"/>
+              </a:defRPr>
+            </a:lvl8pPr>
+            <a:lvl9pPr marL="3657600" algn="l" defTabSz="914400" rtl="0" eaLnBrk="1" latinLnBrk="0" hangingPunct="1">
+              <a:defRPr sz="1800" kern="1200">
+                <a:solidFill>
+                  <a:schemeClr val="tx1"/>
+                </a:solidFill>
+                <a:latin typeface="+mn-lt"/>
+                <a:ea typeface="+mn-ea"/>
+                <a:cs typeface="+mn-cs"/>
+              </a:defRPr>
+            </a:lvl9pPr>
+          </a:lstStyle>
+          <a:p>
+            <a:r>
+              <a:rPr lang="en-US" dirty="0"/>
+              <a:t>Train dataset(80%)</a:t>
+            </a:r>
+            <a:endParaRPr lang="en-IN" dirty="0"/>
+          </a:p>
+          <a:p>
+            <a:endParaRPr lang="en-IN" dirty="0"/>
+          </a:p>
+        </p:txBody>
+      </p:sp>
+      <p:sp>
+        <p:nvSpPr>
+          <p:cNvPr id="8" name="TextBox 7">
+            <a:extLst>
+              <a:ext uri="{FF2B5EF4-FFF2-40B4-BE49-F238E27FC236}">
+                <a16:creationId xmlns:a16="http://schemas.microsoft.com/office/drawing/2014/main" id="{3D89A810-C7AF-3442-86CD-E92D0D396988}"/>
+              </a:ext>
+            </a:extLst>
+          </p:cNvPr>
+          <p:cNvSpPr txBox="1"/>
+          <p:nvPr/>
+        </p:nvSpPr>
+        <p:spPr>
+          <a:xfrm>
+            <a:off x="5796136" y="2343713"/>
+            <a:ext cx="1656184" cy="923330"/>
+          </a:xfrm>
+          <a:prstGeom prst="rect">
+            <a:avLst/>
+          </a:prstGeom>
+          <a:noFill/>
+        </p:spPr>
+        <p:txBody>
+          <a:bodyPr wrap="square" rtlCol="0">
+            <a:spAutoFit/>
+          </a:bodyPr>
+          <a:lstStyle>
+            <a:defPPr>
+              <a:defRPr lang="en-US"/>
+            </a:defPPr>
+            <a:lvl1pPr marL="0" algn="l" defTabSz="914400" rtl="0" eaLnBrk="1" latinLnBrk="0" hangingPunct="1">
+              <a:defRPr sz="1800" kern="1200">
+                <a:solidFill>
+                  <a:schemeClr val="tx1"/>
+                </a:solidFill>
+                <a:latin typeface="+mn-lt"/>
+                <a:ea typeface="+mn-ea"/>
+                <a:cs typeface="+mn-cs"/>
+              </a:defRPr>
+            </a:lvl1pPr>
+            <a:lvl2pPr marL="457200" algn="l" defTabSz="914400" rtl="0" eaLnBrk="1" latinLnBrk="0" hangingPunct="1">
+              <a:defRPr sz="1800" kern="1200">
+                <a:solidFill>
+                  <a:schemeClr val="tx1"/>
+                </a:solidFill>
+                <a:latin typeface="+mn-lt"/>
+                <a:ea typeface="+mn-ea"/>
+                <a:cs typeface="+mn-cs"/>
+              </a:defRPr>
+            </a:lvl2pPr>
+            <a:lvl3pPr marL="914400" algn="l" defTabSz="914400" rtl="0" eaLnBrk="1" latinLnBrk="0" hangingPunct="1">
+              <a:defRPr sz="1800" kern="1200">
+                <a:solidFill>
+                  <a:schemeClr val="tx1"/>
+                </a:solidFill>
+                <a:latin typeface="+mn-lt"/>
+                <a:ea typeface="+mn-ea"/>
+                <a:cs typeface="+mn-cs"/>
+              </a:defRPr>
+            </a:lvl3pPr>
+            <a:lvl4pPr marL="1371600" algn="l" defTabSz="914400" rtl="0" eaLnBrk="1" latinLnBrk="0" hangingPunct="1">
+              <a:defRPr sz="1800" kern="1200">
+                <a:solidFill>
+                  <a:schemeClr val="tx1"/>
+                </a:solidFill>
+                <a:latin typeface="+mn-lt"/>
+                <a:ea typeface="+mn-ea"/>
+                <a:cs typeface="+mn-cs"/>
+              </a:defRPr>
+            </a:lvl4pPr>
+            <a:lvl5pPr marL="1828800" algn="l" defTabSz="914400" rtl="0" eaLnBrk="1" latinLnBrk="0" hangingPunct="1">
+              <a:defRPr sz="1800" kern="1200">
+                <a:solidFill>
+                  <a:schemeClr val="tx1"/>
+                </a:solidFill>
+                <a:latin typeface="+mn-lt"/>
+                <a:ea typeface="+mn-ea"/>
+                <a:cs typeface="+mn-cs"/>
+              </a:defRPr>
+            </a:lvl5pPr>
+            <a:lvl6pPr marL="2286000" algn="l" defTabSz="914400" rtl="0" eaLnBrk="1" latinLnBrk="0" hangingPunct="1">
+              <a:defRPr sz="1800" kern="1200">
+                <a:solidFill>
+                  <a:schemeClr val="tx1"/>
+                </a:solidFill>
+                <a:latin typeface="+mn-lt"/>
+                <a:ea typeface="+mn-ea"/>
+                <a:cs typeface="+mn-cs"/>
+              </a:defRPr>
+            </a:lvl6pPr>
+            <a:lvl7pPr marL="2743200" algn="l" defTabSz="914400" rtl="0" eaLnBrk="1" latinLnBrk="0" hangingPunct="1">
+              <a:defRPr sz="1800" kern="1200">
+                <a:solidFill>
+                  <a:schemeClr val="tx1"/>
+                </a:solidFill>
+                <a:latin typeface="+mn-lt"/>
+                <a:ea typeface="+mn-ea"/>
+                <a:cs typeface="+mn-cs"/>
+              </a:defRPr>
+            </a:lvl7pPr>
+            <a:lvl8pPr marL="3200400" algn="l" defTabSz="914400" rtl="0" eaLnBrk="1" latinLnBrk="0" hangingPunct="1">
+              <a:defRPr sz="1800" kern="1200">
+                <a:solidFill>
+                  <a:schemeClr val="tx1"/>
+                </a:solidFill>
+                <a:latin typeface="+mn-lt"/>
+                <a:ea typeface="+mn-ea"/>
+                <a:cs typeface="+mn-cs"/>
+              </a:defRPr>
+            </a:lvl8pPr>
+            <a:lvl9pPr marL="3657600" algn="l" defTabSz="914400" rtl="0" eaLnBrk="1" latinLnBrk="0" hangingPunct="1">
+              <a:defRPr sz="1800" kern="1200">
+                <a:solidFill>
+                  <a:schemeClr val="tx1"/>
+                </a:solidFill>
+                <a:latin typeface="+mn-lt"/>
+                <a:ea typeface="+mn-ea"/>
+                <a:cs typeface="+mn-cs"/>
+              </a:defRPr>
+            </a:lvl9pPr>
+          </a:lstStyle>
+          <a:p>
+            <a:r>
+              <a:rPr lang="en-US" dirty="0"/>
+              <a:t>Test dataset(20%)</a:t>
+            </a:r>
+            <a:endParaRPr lang="en-IN" dirty="0"/>
+          </a:p>
+          <a:p>
+            <a:endParaRPr lang="en-IN" dirty="0"/>
+          </a:p>
+        </p:txBody>
+      </p:sp>
+      <p:sp>
+        <p:nvSpPr>
+          <p:cNvPr id="9" name="TextBox 8">
+            <a:extLst>
+              <a:ext uri="{FF2B5EF4-FFF2-40B4-BE49-F238E27FC236}">
+                <a16:creationId xmlns:a16="http://schemas.microsoft.com/office/drawing/2014/main" id="{BF44E4C4-8686-C67D-B4B0-33789B155502}"/>
+              </a:ext>
+            </a:extLst>
+          </p:cNvPr>
+          <p:cNvSpPr txBox="1"/>
+          <p:nvPr/>
+        </p:nvSpPr>
+        <p:spPr>
+          <a:xfrm>
+            <a:off x="755576" y="4577742"/>
+            <a:ext cx="7704856" cy="1846659"/>
+          </a:xfrm>
+          <a:prstGeom prst="rect">
+            <a:avLst/>
+          </a:prstGeom>
+          <a:noFill/>
+        </p:spPr>
+        <p:txBody>
+          <a:bodyPr wrap="square" rtlCol="0">
+            <a:spAutoFit/>
+          </a:bodyPr>
+          <a:lstStyle>
+            <a:defPPr>
+              <a:defRPr lang="en-US"/>
+            </a:defPPr>
+            <a:lvl1pPr marL="0" algn="l" defTabSz="914400" rtl="0" eaLnBrk="1" latinLnBrk="0" hangingPunct="1">
+              <a:defRPr sz="1800" kern="1200">
+                <a:solidFill>
+                  <a:schemeClr val="tx1"/>
+                </a:solidFill>
+                <a:latin typeface="+mn-lt"/>
+                <a:ea typeface="+mn-ea"/>
+                <a:cs typeface="+mn-cs"/>
+              </a:defRPr>
+            </a:lvl1pPr>
+            <a:lvl2pPr marL="457200" algn="l" defTabSz="914400" rtl="0" eaLnBrk="1" latinLnBrk="0" hangingPunct="1">
+              <a:defRPr sz="1800" kern="1200">
+                <a:solidFill>
+                  <a:schemeClr val="tx1"/>
+                </a:solidFill>
+                <a:latin typeface="+mn-lt"/>
+                <a:ea typeface="+mn-ea"/>
+                <a:cs typeface="+mn-cs"/>
+              </a:defRPr>
+            </a:lvl2pPr>
+            <a:lvl3pPr marL="914400" algn="l" defTabSz="914400" rtl="0" eaLnBrk="1" latinLnBrk="0" hangingPunct="1">
+              <a:defRPr sz="1800" kern="1200">
+                <a:solidFill>
+                  <a:schemeClr val="tx1"/>
+                </a:solidFill>
+                <a:latin typeface="+mn-lt"/>
+                <a:ea typeface="+mn-ea"/>
+                <a:cs typeface="+mn-cs"/>
+              </a:defRPr>
+            </a:lvl3pPr>
+            <a:lvl4pPr marL="1371600" algn="l" defTabSz="914400" rtl="0" eaLnBrk="1" latinLnBrk="0" hangingPunct="1">
+              <a:defRPr sz="1800" kern="1200">
+                <a:solidFill>
+                  <a:schemeClr val="tx1"/>
+                </a:solidFill>
+                <a:latin typeface="+mn-lt"/>
+                <a:ea typeface="+mn-ea"/>
+                <a:cs typeface="+mn-cs"/>
+              </a:defRPr>
+            </a:lvl4pPr>
+            <a:lvl5pPr marL="1828800" algn="l" defTabSz="914400" rtl="0" eaLnBrk="1" latinLnBrk="0" hangingPunct="1">
+              <a:defRPr sz="1800" kern="1200">
+                <a:solidFill>
+                  <a:schemeClr val="tx1"/>
+                </a:solidFill>
+                <a:latin typeface="+mn-lt"/>
+                <a:ea typeface="+mn-ea"/>
+                <a:cs typeface="+mn-cs"/>
+              </a:defRPr>
+            </a:lvl5pPr>
+            <a:lvl6pPr marL="2286000" algn="l" defTabSz="914400" rtl="0" eaLnBrk="1" latinLnBrk="0" hangingPunct="1">
+              <a:defRPr sz="1800" kern="1200">
+                <a:solidFill>
+                  <a:schemeClr val="tx1"/>
+                </a:solidFill>
+                <a:latin typeface="+mn-lt"/>
+                <a:ea typeface="+mn-ea"/>
+                <a:cs typeface="+mn-cs"/>
+              </a:defRPr>
+            </a:lvl6pPr>
+            <a:lvl7pPr marL="2743200" algn="l" defTabSz="914400" rtl="0" eaLnBrk="1" latinLnBrk="0" hangingPunct="1">
+              <a:defRPr sz="1800" kern="1200">
+                <a:solidFill>
+                  <a:schemeClr val="tx1"/>
+                </a:solidFill>
+                <a:latin typeface="+mn-lt"/>
+                <a:ea typeface="+mn-ea"/>
+                <a:cs typeface="+mn-cs"/>
+              </a:defRPr>
+            </a:lvl7pPr>
+            <a:lvl8pPr marL="3200400" algn="l" defTabSz="914400" rtl="0" eaLnBrk="1" latinLnBrk="0" hangingPunct="1">
+              <a:defRPr sz="1800" kern="1200">
+                <a:solidFill>
+                  <a:schemeClr val="tx1"/>
+                </a:solidFill>
+                <a:latin typeface="+mn-lt"/>
+                <a:ea typeface="+mn-ea"/>
+                <a:cs typeface="+mn-cs"/>
+              </a:defRPr>
+            </a:lvl8pPr>
+            <a:lvl9pPr marL="3657600" algn="l" defTabSz="914400" rtl="0" eaLnBrk="1" latinLnBrk="0" hangingPunct="1">
+              <a:defRPr sz="1800" kern="1200">
+                <a:solidFill>
+                  <a:schemeClr val="tx1"/>
+                </a:solidFill>
+                <a:latin typeface="+mn-lt"/>
+                <a:ea typeface="+mn-ea"/>
+                <a:cs typeface="+mn-cs"/>
+              </a:defRPr>
+            </a:lvl9pPr>
+          </a:lstStyle>
+          <a:p>
+            <a:pPr marL="285750" indent="-285750">
+              <a:buFont typeface="Wingdings" pitchFamily="2" charset="2"/>
+              <a:buChar char="v"/>
+            </a:pPr>
+            <a:r>
+              <a:rPr lang="en-US" sz="2400" dirty="0"/>
+              <a:t>The data partition is done using </a:t>
+            </a:r>
+            <a:r>
+              <a:rPr lang="en-US" sz="2400" dirty="0" err="1"/>
+              <a:t>train_test_split</a:t>
+            </a:r>
+            <a:r>
+              <a:rPr lang="en-US" sz="2400" dirty="0"/>
+              <a:t> from </a:t>
+            </a:r>
+            <a:r>
+              <a:rPr lang="en-US" sz="2400" dirty="0" err="1"/>
+              <a:t>sklearn</a:t>
+            </a:r>
+            <a:r>
+              <a:rPr lang="en-US" sz="2400" dirty="0"/>
+              <a:t> library.</a:t>
+            </a:r>
+          </a:p>
+          <a:p>
+            <a:pPr marL="285750" indent="-285750">
+              <a:buFont typeface="Wingdings" pitchFamily="2" charset="2"/>
+              <a:buChar char="v"/>
+            </a:pPr>
+            <a:r>
+              <a:rPr lang="en-US" sz="2400" dirty="0"/>
+              <a:t> 80% data is kept in train, whereas 30% is used for test</a:t>
+            </a:r>
+            <a:endParaRPr lang="en-IN" sz="2400" dirty="0"/>
+          </a:p>
+          <a:p>
+            <a:endParaRPr lang="en-IN" dirty="0"/>
+          </a:p>
+        </p:txBody>
+      </p:sp>
     </p:spTree>
     <p:extLst>
       <p:ext uri="{BB962C8B-B14F-4D97-AF65-F5344CB8AC3E}">
-        <p14:creationId xmlns:p14="http://schemas.microsoft.com/office/powerpoint/2010/main" val="2384467839"/>
+        <p14:creationId xmlns:p14="http://schemas.microsoft.com/office/powerpoint/2010/main" val="2977819541"/>
       </p:ext>
     </p:extLst>
   </p:cSld>
@@ -5503,40 +6248,69 @@
           <a:chExt cx="0" cy="0"/>
         </a:xfrm>
       </p:grpSpPr>
+      <p:sp>
+        <p:nvSpPr>
+          <p:cNvPr id="2" name="Title 1">
+            <a:extLst>
+              <a:ext uri="{FF2B5EF4-FFF2-40B4-BE49-F238E27FC236}">
+                <a16:creationId xmlns:a16="http://schemas.microsoft.com/office/drawing/2014/main" id="{70C6C638-0098-5BF6-066A-04E264C9C41A}"/>
+              </a:ext>
+            </a:extLst>
+          </p:cNvPr>
+          <p:cNvSpPr>
+            <a:spLocks noGrp="1"/>
+          </p:cNvSpPr>
+          <p:nvPr>
+            <p:ph type="title"/>
+          </p:nvPr>
+        </p:nvSpPr>
+        <p:spPr/>
+        <p:txBody>
+          <a:bodyPr/>
+          <a:lstStyle/>
+          <a:p>
+            <a:pPr algn="ctr"/>
+            <a:r>
+              <a:rPr lang="en-US" dirty="0"/>
+              <a:t>LSTM Model Evaluation</a:t>
+            </a:r>
+            <a:endParaRPr lang="en-IN" dirty="0"/>
+          </a:p>
+        </p:txBody>
+      </p:sp>
       <p:pic>
         <p:nvPicPr>
-          <p:cNvPr id="2" name="Picture 1"/>
+          <p:cNvPr id="5" name="Content Placeholder 4">
+            <a:extLst>
+              <a:ext uri="{FF2B5EF4-FFF2-40B4-BE49-F238E27FC236}">
+                <a16:creationId xmlns:a16="http://schemas.microsoft.com/office/drawing/2014/main" id="{339FCA32-E6C0-95E4-63A3-1FEAF2A6965B}"/>
+              </a:ext>
+            </a:extLst>
+          </p:cNvPr>
           <p:cNvPicPr>
-            <a:picLocks noChangeAspect="1"/>
+            <a:picLocks noGrp="1" noChangeAspect="1"/>
           </p:cNvPicPr>
-          <p:nvPr/>
+          <p:nvPr>
+            <p:ph sz="quarter" idx="1"/>
+          </p:nvPr>
         </p:nvPicPr>
         <p:blipFill>
-          <a:blip r:embed="rId2">
-            <a:extLst>
-              <a:ext uri="{28A0092B-C50C-407E-A947-70E740481C1C}">
-                <a14:useLocalDpi xmlns:a14="http://schemas.microsoft.com/office/drawing/2010/main" val="0"/>
-              </a:ext>
-            </a:extLst>
-          </a:blip>
+          <a:blip r:embed="rId2"/>
           <a:stretch>
             <a:fillRect/>
           </a:stretch>
         </p:blipFill>
         <p:spPr>
           <a:xfrm>
-            <a:off x="539552" y="332656"/>
-            <a:ext cx="7848872" cy="5904656"/>
-          </a:xfrm>
-          <a:prstGeom prst="rect">
-            <a:avLst/>
-          </a:prstGeom>
+            <a:off x="1079612" y="2060848"/>
+            <a:ext cx="6984775" cy="3240359"/>
+          </a:xfrm>
         </p:spPr>
       </p:pic>
     </p:spTree>
     <p:extLst>
       <p:ext uri="{BB962C8B-B14F-4D97-AF65-F5344CB8AC3E}">
-        <p14:creationId xmlns:p14="http://schemas.microsoft.com/office/powerpoint/2010/main" val="643181526"/>
+        <p14:creationId xmlns:p14="http://schemas.microsoft.com/office/powerpoint/2010/main" val="1418132835"/>
       </p:ext>
     </p:extLst>
   </p:cSld>
@@ -5563,40 +6337,42 @@
           <a:chExt cx="0" cy="0"/>
         </a:xfrm>
       </p:grpSpPr>
-      <p:pic>
-        <p:nvPicPr>
-          <p:cNvPr id="2" name="Picture 1"/>
-          <p:cNvPicPr>
-            <a:picLocks noChangeAspect="1"/>
-          </p:cNvPicPr>
+      <p:sp>
+        <p:nvSpPr>
+          <p:cNvPr id="2" name="Rectangle 1"/>
+          <p:cNvSpPr/>
           <p:nvPr/>
-        </p:nvPicPr>
-        <p:blipFill>
-          <a:blip r:embed="rId2">
-            <a:extLst>
-              <a:ext uri="{28A0092B-C50C-407E-A947-70E740481C1C}">
-                <a14:useLocalDpi xmlns:a14="http://schemas.microsoft.com/office/drawing/2010/main" val="0"/>
-              </a:ext>
-            </a:extLst>
-          </a:blip>
-          <a:stretch>
-            <a:fillRect/>
-          </a:stretch>
-        </p:blipFill>
+        </p:nvSpPr>
         <p:spPr>
           <a:xfrm>
-            <a:off x="290883" y="692696"/>
-            <a:ext cx="8496944" cy="5544616"/>
+            <a:off x="323528" y="2828835"/>
+            <a:ext cx="8532440" cy="830997"/>
           </a:xfrm>
           <a:prstGeom prst="rect">
             <a:avLst/>
           </a:prstGeom>
         </p:spPr>
-      </p:pic>
+        <p:txBody>
+          <a:bodyPr wrap="square">
+            <a:spAutoFit/>
+          </a:bodyPr>
+          <a:lstStyle/>
+          <a:p>
+            <a:pPr algn="ctr"/>
+            <a:r>
+              <a:rPr lang="en-US" sz="4800" dirty="0">
+                <a:cs typeface="Arial" pitchFamily="34" charset="0"/>
+              </a:rPr>
+              <a:t>Data Visualization</a:t>
+            </a:r>
+            <a:endParaRPr lang="en-IN" sz="4800" dirty="0"/>
+          </a:p>
+        </p:txBody>
+      </p:sp>
     </p:spTree>
     <p:extLst>
       <p:ext uri="{BB962C8B-B14F-4D97-AF65-F5344CB8AC3E}">
-        <p14:creationId xmlns:p14="http://schemas.microsoft.com/office/powerpoint/2010/main" val="2367533856"/>
+        <p14:creationId xmlns:p14="http://schemas.microsoft.com/office/powerpoint/2010/main" val="1770785593"/>
       </p:ext>
     </p:extLst>
   </p:cSld>
@@ -5645,8 +6421,8 @@
         </p:blipFill>
         <p:spPr>
           <a:xfrm>
-            <a:off x="0" y="116632"/>
-            <a:ext cx="9144000" cy="6741368"/>
+            <a:off x="0" y="0"/>
+            <a:ext cx="9144000" cy="6858000"/>
           </a:xfrm>
           <a:prstGeom prst="rect">
             <a:avLst/>
@@ -5656,7 +6432,7 @@
     </p:spTree>
     <p:extLst>
       <p:ext uri="{BB962C8B-B14F-4D97-AF65-F5344CB8AC3E}">
-        <p14:creationId xmlns:p14="http://schemas.microsoft.com/office/powerpoint/2010/main" val="436053809"/>
+        <p14:creationId xmlns:p14="http://schemas.microsoft.com/office/powerpoint/2010/main" val="2961477991"/>
       </p:ext>
     </p:extLst>
   </p:cSld>
@@ -5685,7 +6461,13 @@
       </p:grpSpPr>
       <p:pic>
         <p:nvPicPr>
-          <p:cNvPr id="2" name="Picture 1"/>
+          <p:cNvPr id="7" name="Picture 6" descr="A graph of different colored bars&#10;&#10;Description automatically generated">
+            <a:extLst>
+              <a:ext uri="{FF2B5EF4-FFF2-40B4-BE49-F238E27FC236}">
+                <a16:creationId xmlns:a16="http://schemas.microsoft.com/office/drawing/2014/main" id="{BB3CB3B1-183D-A56C-7CE3-DAF08701E914}"/>
+              </a:ext>
+            </a:extLst>
+          </p:cNvPr>
           <p:cNvPicPr>
             <a:picLocks noChangeAspect="1"/>
           </p:cNvPicPr>
@@ -5716,7 +6498,7 @@
     </p:spTree>
     <p:extLst>
       <p:ext uri="{BB962C8B-B14F-4D97-AF65-F5344CB8AC3E}">
-        <p14:creationId xmlns:p14="http://schemas.microsoft.com/office/powerpoint/2010/main" val="1917613893"/>
+        <p14:creationId xmlns:p14="http://schemas.microsoft.com/office/powerpoint/2010/main" val="2384467839"/>
       </p:ext>
     </p:extLst>
   </p:cSld>
@@ -5745,7 +6527,13 @@
       </p:grpSpPr>
       <p:pic>
         <p:nvPicPr>
-          <p:cNvPr id="2" name="Picture 1"/>
+          <p:cNvPr id="3" name="Picture 2" descr="A graph of a bar graph&#10;&#10;Description automatically generated with medium confidence">
+            <a:extLst>
+              <a:ext uri="{FF2B5EF4-FFF2-40B4-BE49-F238E27FC236}">
+                <a16:creationId xmlns:a16="http://schemas.microsoft.com/office/drawing/2014/main" id="{947160E9-FD5C-6CF5-FC99-36BED8CB1400}"/>
+              </a:ext>
+            </a:extLst>
+          </p:cNvPr>
           <p:cNvPicPr>
             <a:picLocks noChangeAspect="1"/>
           </p:cNvPicPr>
@@ -5776,7 +6564,7 @@
     </p:spTree>
     <p:extLst>
       <p:ext uri="{BB962C8B-B14F-4D97-AF65-F5344CB8AC3E}">
-        <p14:creationId xmlns:p14="http://schemas.microsoft.com/office/powerpoint/2010/main" val="2961477991"/>
+        <p14:creationId xmlns:p14="http://schemas.microsoft.com/office/powerpoint/2010/main" val="3570699876"/>
       </p:ext>
     </p:extLst>
   </p:cSld>
@@ -5805,7 +6593,13 @@
       </p:grpSpPr>
       <p:pic>
         <p:nvPicPr>
-          <p:cNvPr id="2" name="Picture 1"/>
+          <p:cNvPr id="6" name="Picture 5" descr="A graph of different colored rectangular shapes&#10;&#10;Description automatically generated">
+            <a:extLst>
+              <a:ext uri="{FF2B5EF4-FFF2-40B4-BE49-F238E27FC236}">
+                <a16:creationId xmlns:a16="http://schemas.microsoft.com/office/drawing/2014/main" id="{EB0C52EA-1A01-D486-B3BB-4D3FF845521A}"/>
+              </a:ext>
+            </a:extLst>
+          </p:cNvPr>
           <p:cNvPicPr>
             <a:picLocks noChangeAspect="1"/>
           </p:cNvPicPr>
@@ -5836,7 +6630,7 @@
     </p:spTree>
     <p:extLst>
       <p:ext uri="{BB962C8B-B14F-4D97-AF65-F5344CB8AC3E}">
-        <p14:creationId xmlns:p14="http://schemas.microsoft.com/office/powerpoint/2010/main" val="122332340"/>
+        <p14:creationId xmlns:p14="http://schemas.microsoft.com/office/powerpoint/2010/main" val="643181526"/>
       </p:ext>
     </p:extLst>
   </p:cSld>
@@ -5865,7 +6659,13 @@
       </p:grpSpPr>
       <p:pic>
         <p:nvPicPr>
-          <p:cNvPr id="2" name="Picture 1"/>
+          <p:cNvPr id="4" name="Picture 3" descr="A graph of different colored squares&#10;&#10;Description automatically generated">
+            <a:extLst>
+              <a:ext uri="{FF2B5EF4-FFF2-40B4-BE49-F238E27FC236}">
+                <a16:creationId xmlns:a16="http://schemas.microsoft.com/office/drawing/2014/main" id="{30A1CA49-A3A3-9DD3-87F4-1F106CCA4146}"/>
+              </a:ext>
+            </a:extLst>
+          </p:cNvPr>
           <p:cNvPicPr>
             <a:picLocks noChangeAspect="1"/>
           </p:cNvPicPr>
@@ -5896,7 +6696,7 @@
     </p:spTree>
     <p:extLst>
       <p:ext uri="{BB962C8B-B14F-4D97-AF65-F5344CB8AC3E}">
-        <p14:creationId xmlns:p14="http://schemas.microsoft.com/office/powerpoint/2010/main" val="635609995"/>
+        <p14:creationId xmlns:p14="http://schemas.microsoft.com/office/powerpoint/2010/main" val="2367533856"/>
       </p:ext>
     </p:extLst>
   </p:cSld>
@@ -6193,8 +6993,8 @@
         </p:blipFill>
         <p:spPr>
           <a:xfrm>
-            <a:off x="1" y="0"/>
-            <a:ext cx="9144000" cy="6858000"/>
+            <a:off x="0" y="116632"/>
+            <a:ext cx="9144000" cy="6741368"/>
           </a:xfrm>
           <a:prstGeom prst="rect">
             <a:avLst/>
@@ -6204,7 +7004,7 @@
     </p:spTree>
     <p:extLst>
       <p:ext uri="{BB962C8B-B14F-4D97-AF65-F5344CB8AC3E}">
-        <p14:creationId xmlns:p14="http://schemas.microsoft.com/office/powerpoint/2010/main" val="2348011779"/>
+        <p14:creationId xmlns:p14="http://schemas.microsoft.com/office/powerpoint/2010/main" val="436053809"/>
       </p:ext>
     </p:extLst>
   </p:cSld>
@@ -6215,6 +7015,204 @@
 </file>
 
 <file path=ppt/slides/slide21.xml><?xml version="1.0" encoding="utf-8"?>
+<p:sld xmlns:a="http://schemas.openxmlformats.org/drawingml/2006/main" xmlns:r="http://schemas.openxmlformats.org/officeDocument/2006/relationships" xmlns:p="http://schemas.openxmlformats.org/presentationml/2006/main">
+  <p:cSld>
+    <p:spTree>
+      <p:nvGrpSpPr>
+        <p:cNvPr id="1" name=""/>
+        <p:cNvGrpSpPr/>
+        <p:nvPr/>
+      </p:nvGrpSpPr>
+      <p:grpSpPr>
+        <a:xfrm>
+          <a:off x="0" y="0"/>
+          <a:ext cx="0" cy="0"/>
+          <a:chOff x="0" y="0"/>
+          <a:chExt cx="0" cy="0"/>
+        </a:xfrm>
+      </p:grpSpPr>
+      <p:pic>
+        <p:nvPicPr>
+          <p:cNvPr id="4" name="Picture 3" descr="A graph of different colored squares&#10;&#10;Description automatically generated">
+            <a:extLst>
+              <a:ext uri="{FF2B5EF4-FFF2-40B4-BE49-F238E27FC236}">
+                <a16:creationId xmlns:a16="http://schemas.microsoft.com/office/drawing/2014/main" id="{C4BF8148-16E9-DC85-0944-E55CC8A97CC6}"/>
+              </a:ext>
+            </a:extLst>
+          </p:cNvPr>
+          <p:cNvPicPr>
+            <a:picLocks noChangeAspect="1"/>
+          </p:cNvPicPr>
+          <p:nvPr/>
+        </p:nvPicPr>
+        <p:blipFill>
+          <a:blip r:embed="rId2">
+            <a:extLst>
+              <a:ext uri="{28A0092B-C50C-407E-A947-70E740481C1C}">
+                <a14:useLocalDpi xmlns:a14="http://schemas.microsoft.com/office/drawing/2010/main" val="0"/>
+              </a:ext>
+            </a:extLst>
+          </a:blip>
+          <a:stretch>
+            <a:fillRect/>
+          </a:stretch>
+        </p:blipFill>
+        <p:spPr>
+          <a:xfrm>
+            <a:off x="0" y="0"/>
+            <a:ext cx="9144000" cy="6858000"/>
+          </a:xfrm>
+          <a:prstGeom prst="rect">
+            <a:avLst/>
+          </a:prstGeom>
+        </p:spPr>
+      </p:pic>
+    </p:spTree>
+    <p:extLst>
+      <p:ext uri="{BB962C8B-B14F-4D97-AF65-F5344CB8AC3E}">
+        <p14:creationId xmlns:p14="http://schemas.microsoft.com/office/powerpoint/2010/main" val="122332340"/>
+      </p:ext>
+    </p:extLst>
+  </p:cSld>
+  <p:clrMapOvr>
+    <a:masterClrMapping/>
+  </p:clrMapOvr>
+</p:sld>
+</file>
+
+<file path=ppt/slides/slide22.xml><?xml version="1.0" encoding="utf-8"?>
+<p:sld xmlns:a="http://schemas.openxmlformats.org/drawingml/2006/main" xmlns:r="http://schemas.openxmlformats.org/officeDocument/2006/relationships" xmlns:p="http://schemas.openxmlformats.org/presentationml/2006/main">
+  <p:cSld>
+    <p:spTree>
+      <p:nvGrpSpPr>
+        <p:cNvPr id="1" name=""/>
+        <p:cNvGrpSpPr/>
+        <p:nvPr/>
+      </p:nvGrpSpPr>
+      <p:grpSpPr>
+        <a:xfrm>
+          <a:off x="0" y="0"/>
+          <a:ext cx="0" cy="0"/>
+          <a:chOff x="0" y="0"/>
+          <a:chExt cx="0" cy="0"/>
+        </a:xfrm>
+      </p:grpSpPr>
+      <p:pic>
+        <p:nvPicPr>
+          <p:cNvPr id="4" name="Picture 3" descr="A graph of different colored rectangular shapes&#10;&#10;Description automatically generated">
+            <a:extLst>
+              <a:ext uri="{FF2B5EF4-FFF2-40B4-BE49-F238E27FC236}">
+                <a16:creationId xmlns:a16="http://schemas.microsoft.com/office/drawing/2014/main" id="{1A6F8BB2-8933-4622-A9AD-7E485BBA8466}"/>
+              </a:ext>
+            </a:extLst>
+          </p:cNvPr>
+          <p:cNvPicPr>
+            <a:picLocks noChangeAspect="1"/>
+          </p:cNvPicPr>
+          <p:nvPr/>
+        </p:nvPicPr>
+        <p:blipFill>
+          <a:blip r:embed="rId2">
+            <a:extLst>
+              <a:ext uri="{28A0092B-C50C-407E-A947-70E740481C1C}">
+                <a14:useLocalDpi xmlns:a14="http://schemas.microsoft.com/office/drawing/2010/main" val="0"/>
+              </a:ext>
+            </a:extLst>
+          </a:blip>
+          <a:stretch>
+            <a:fillRect/>
+          </a:stretch>
+        </p:blipFill>
+        <p:spPr>
+          <a:xfrm>
+            <a:off x="0" y="0"/>
+            <a:ext cx="9144000" cy="6858000"/>
+          </a:xfrm>
+          <a:prstGeom prst="rect">
+            <a:avLst/>
+          </a:prstGeom>
+        </p:spPr>
+      </p:pic>
+    </p:spTree>
+    <p:extLst>
+      <p:ext uri="{BB962C8B-B14F-4D97-AF65-F5344CB8AC3E}">
+        <p14:creationId xmlns:p14="http://schemas.microsoft.com/office/powerpoint/2010/main" val="635609995"/>
+      </p:ext>
+    </p:extLst>
+  </p:cSld>
+  <p:clrMapOvr>
+    <a:masterClrMapping/>
+  </p:clrMapOvr>
+</p:sld>
+</file>
+
+<file path=ppt/slides/slide23.xml><?xml version="1.0" encoding="utf-8"?>
+<p:sld xmlns:a="http://schemas.openxmlformats.org/drawingml/2006/main" xmlns:r="http://schemas.openxmlformats.org/officeDocument/2006/relationships" xmlns:p="http://schemas.openxmlformats.org/presentationml/2006/main">
+  <p:cSld>
+    <p:spTree>
+      <p:nvGrpSpPr>
+        <p:cNvPr id="1" name=""/>
+        <p:cNvGrpSpPr/>
+        <p:nvPr/>
+      </p:nvGrpSpPr>
+      <p:grpSpPr>
+        <a:xfrm>
+          <a:off x="0" y="0"/>
+          <a:ext cx="0" cy="0"/>
+          <a:chOff x="0" y="0"/>
+          <a:chExt cx="0" cy="0"/>
+        </a:xfrm>
+      </p:grpSpPr>
+      <p:pic>
+        <p:nvPicPr>
+          <p:cNvPr id="3" name="Picture 2" descr="A graph of different colored rectangles&#10;&#10;Description automatically generated">
+            <a:extLst>
+              <a:ext uri="{FF2B5EF4-FFF2-40B4-BE49-F238E27FC236}">
+                <a16:creationId xmlns:a16="http://schemas.microsoft.com/office/drawing/2014/main" id="{11ABCC6A-36EB-1790-0371-476C0439E452}"/>
+              </a:ext>
+            </a:extLst>
+          </p:cNvPr>
+          <p:cNvPicPr>
+            <a:picLocks noChangeAspect="1"/>
+          </p:cNvPicPr>
+          <p:nvPr/>
+        </p:nvPicPr>
+        <p:blipFill>
+          <a:blip r:embed="rId2">
+            <a:extLst>
+              <a:ext uri="{28A0092B-C50C-407E-A947-70E740481C1C}">
+                <a14:useLocalDpi xmlns:a14="http://schemas.microsoft.com/office/drawing/2010/main" val="0"/>
+              </a:ext>
+            </a:extLst>
+          </a:blip>
+          <a:stretch>
+            <a:fillRect/>
+          </a:stretch>
+        </p:blipFill>
+        <p:spPr>
+          <a:xfrm>
+            <a:off x="0" y="0"/>
+            <a:ext cx="9144000" cy="6858000"/>
+          </a:xfrm>
+          <a:prstGeom prst="rect">
+            <a:avLst/>
+          </a:prstGeom>
+        </p:spPr>
+      </p:pic>
+    </p:spTree>
+    <p:extLst>
+      <p:ext uri="{BB962C8B-B14F-4D97-AF65-F5344CB8AC3E}">
+        <p14:creationId xmlns:p14="http://schemas.microsoft.com/office/powerpoint/2010/main" val="1693287195"/>
+      </p:ext>
+    </p:extLst>
+  </p:cSld>
+  <p:clrMapOvr>
+    <a:masterClrMapping/>
+  </p:clrMapOvr>
+</p:sld>
+</file>
+
+<file path=ppt/slides/slide24.xml><?xml version="1.0" encoding="utf-8"?>
 <p:sld xmlns:a="http://schemas.openxmlformats.org/drawingml/2006/main" xmlns:r="http://schemas.openxmlformats.org/officeDocument/2006/relationships" xmlns:p="http://schemas.openxmlformats.org/presentationml/2006/main">
   <p:cSld>
     <p:spTree>
@@ -8181,7 +9179,7 @@
           <a:p>
             <a:r>
               <a:rPr lang="en-US" dirty="0"/>
-              <a:t>Transforming and preprocessing raw text to improve its quality, consistency, and suitability for text mining. Sentiment analysis, topic modeling, or any other NLP application. Here are some common techniques used for text data cleaning.</a:t>
+              <a:t>Transforming and preprocessing raw text to improve its quality, consistency, and suitability for text mining. Topic modeling, or any other NLP application. Here are some common techniques used for text data cleaning.</a:t>
             </a:r>
           </a:p>
           <a:p>
@@ -8199,7 +9197,7 @@
             </a:pPr>
             <a:r>
               <a:rPr lang="en-US" dirty="0"/>
-              <a:t> Converting to lowercase</a:t>
+              <a:t>Converting to lowercase.</a:t>
             </a:r>
           </a:p>
           <a:p>
@@ -8208,8 +9206,19 @@
             </a:pPr>
             <a:r>
               <a:rPr lang="en-US" dirty="0"/>
-              <a:t> Tokenization</a:t>
-            </a:r>
+              <a:t>Removing Punctuations.</a:t>
+            </a:r>
+          </a:p>
+          <a:p>
+            <a:pPr marL="457200" indent="-457200">
+              <a:buFont typeface="Wingdings"/>
+              <a:buAutoNum type="alphaLcParenR"/>
+            </a:pPr>
+            <a:r>
+              <a:rPr lang="en-IN" dirty="0"/>
+              <a:t>Removing Common Words.</a:t>
+            </a:r>
+            <a:endParaRPr lang="en-US" dirty="0"/>
           </a:p>
           <a:p>
             <a:pPr marL="457200" indent="-457200">
@@ -8217,29 +9226,8 @@
             </a:pPr>
             <a:r>
               <a:rPr lang="en-US" dirty="0"/>
-              <a:t> Removing stop words</a:t>
-            </a:r>
-          </a:p>
-          <a:p>
-            <a:pPr marL="457200" indent="-457200">
-              <a:buAutoNum type="alphaLcParenR"/>
-            </a:pPr>
-            <a:r>
-              <a:rPr lang="en-US" dirty="0"/>
-              <a:t> Lemmatization</a:t>
-            </a:r>
-          </a:p>
-          <a:p>
-            <a:pPr marL="457200" indent="-457200">
-              <a:buAutoNum type="alphaLcParenR"/>
-            </a:pPr>
-            <a:r>
-              <a:rPr lang="en-US" dirty="0"/>
-              <a:t> Removing Numbers </a:t>
-            </a:r>
-            <a:endParaRPr lang="en-IN" dirty="0"/>
-          </a:p>
-          <a:p>
+              <a:t>Tokenization.</a:t>
+            </a:r>
             <a:endParaRPr lang="en-IN" dirty="0"/>
           </a:p>
         </p:txBody>

</xml_diff>